<commit_message>
Adjustmets to prez before class.
</commit_message>
<xml_diff>
--- a/docs/LIMEaid_Final.pptx
+++ b/docs/LIMEaid_Final.pptx
@@ -264,6 +264,14 @@
 </p:cmAuthorLst>
 </file>
 
+<file path=ppt/revisionInfo.xml><?xml version="1.0" encoding="utf-8"?>
+<p1510:revInfo xmlns:a="http://schemas.openxmlformats.org/drawingml/2006/main" xmlns:r="http://schemas.openxmlformats.org/officeDocument/2006/relationships" xmlns:p1510="http://schemas.microsoft.com/office/powerpoint/2015/10/main">
+  <p1510:revLst>
+    <p1510:client id="{2D07F7FF-E37B-4422-A18B-E1DEC631B1D2}" v="5" dt="2019-06-04T23:31:21.031"/>
+  </p1510:revLst>
+</p1510:revInfo>
+</file>
+
 <file path=ppt/handoutMasters/handoutMaster1.xml><?xml version="1.0" encoding="utf-8"?>
 <p:handoutMaster xmlns:a="http://schemas.openxmlformats.org/drawingml/2006/main" xmlns:r="http://schemas.openxmlformats.org/officeDocument/2006/relationships" xmlns:p="http://schemas.openxmlformats.org/presentationml/2006/main">
   <p:cSld>
@@ -350,7 +358,7 @@
               <a:rPr lang="en-US" smtClean="0">
                 <a:latin typeface="Segoe UI" pitchFamily="34" charset="0"/>
               </a:rPr>
-              <a:t>6/1/19</a:t>
+              <a:t>6/4/2019</a:t>
             </a:fld>
             <a:endParaRPr lang="en-US" dirty="0">
               <a:latin typeface="Segoe UI" pitchFamily="34" charset="0"/>
@@ -673,7 +681,7 @@
             <a:fld id="{D51B1278-D92B-4AF3-A9C1-71DD298190CE}" type="datetimeFigureOut">
               <a:rPr lang="en-US" smtClean="0"/>
               <a:pPr/>
-              <a:t>6/1/19</a:t>
+              <a:t>6/4/2019</a:t>
             </a:fld>
             <a:endParaRPr lang="en-US" dirty="0"/>
           </a:p>
@@ -988,7 +996,7 @@
                 </a:solidFill>
               </a:rPr>
               <a:pPr/>
-              <a:t>6/1/19</a:t>
+              <a:t>6/4/2019</a:t>
             </a:fld>
             <a:endParaRPr lang="en-US" dirty="0">
               <a:solidFill>
@@ -22549,8 +22557,8 @@
         </p:nvSpPr>
         <p:spPr>
           <a:xfrm>
-            <a:off x="274639" y="1212849"/>
-            <a:ext cx="11889564" cy="6235553"/>
+            <a:off x="271292" y="1135062"/>
+            <a:ext cx="11889564" cy="7183505"/>
           </a:xfrm>
         </p:spPr>
         <p:txBody>
@@ -22562,12 +22570,12 @@
               <a:buChar char="§"/>
             </a:pPr>
             <a:r>
-              <a:rPr lang="en-US" sz="2800" b="1" dirty="0"/>
-              <a:t>API support </a:t>
-            </a:r>
-            <a:r>
-              <a:rPr lang="en-US" sz="2800" dirty="0"/>
-              <a:t>for data acquisition to support dynamic features:</a:t>
+              <a:rPr lang="en-US" sz="2800" b="1" dirty="0">
+                <a:solidFill>
+                  <a:schemeClr val="accent1"/>
+                </a:solidFill>
+              </a:rPr>
+              <a:t>API support for data acquisition to support dynamic features:</a:t>
             </a:r>
           </a:p>
           <a:p>
@@ -22618,12 +22626,12 @@
               <a:buChar char="§"/>
             </a:pPr>
             <a:r>
-              <a:rPr lang="en-US" sz="2800" b="1" dirty="0"/>
-              <a:t>Model tuning</a:t>
-            </a:r>
-            <a:r>
-              <a:rPr lang="en-US" sz="2800" dirty="0"/>
-              <a:t> for examples: </a:t>
+              <a:rPr lang="en-US" sz="2800" b="1" dirty="0">
+                <a:solidFill>
+                  <a:schemeClr val="accent1"/>
+                </a:solidFill>
+              </a:rPr>
+              <a:t>Model tuning for examples: </a:t>
             </a:r>
           </a:p>
           <a:p>
@@ -22663,15 +22671,44 @@
                   <a:schemeClr val="accent1"/>
                 </a:solidFill>
               </a:rPr>
+              <a:t>Better way to generate random samples</a:t>
+            </a:r>
+          </a:p>
+          <a:p>
+            <a:pPr marL="742950" indent="-742950">
+              <a:buFont typeface="Wingdings" pitchFamily="2" charset="2"/>
+              <a:buChar char="§"/>
+            </a:pPr>
+            <a:endParaRPr lang="en-US" sz="2800" b="1" dirty="0">
+              <a:solidFill>
+                <a:schemeClr val="accent1"/>
+              </a:solidFill>
+            </a:endParaRPr>
+          </a:p>
+          <a:p>
+            <a:pPr marL="742950" indent="-742950">
+              <a:buFont typeface="Wingdings" pitchFamily="2" charset="2"/>
+              <a:buChar char="§"/>
+            </a:pPr>
+            <a:r>
+              <a:rPr lang="en-US" sz="2800" b="1" dirty="0">
+                <a:solidFill>
+                  <a:schemeClr val="accent1"/>
+                </a:solidFill>
+              </a:rPr>
               <a:t>M</a:t>
             </a:r>
             <a:r>
               <a:rPr lang="en-US" sz="2800" b="1" dirty="0"/>
-              <a:t>odify penalty</a:t>
-            </a:r>
-            <a:r>
-              <a:rPr lang="en-US" sz="2800" dirty="0"/>
-              <a:t> for number of coefficients</a:t>
+              <a:t>odify </a:t>
+            </a:r>
+            <a:r>
+              <a:rPr lang="en-US" sz="2800" b="1" dirty="0">
+                <a:solidFill>
+                  <a:schemeClr val="accent1"/>
+                </a:solidFill>
+              </a:rPr>
+              <a:t>penalty for number of coefficients</a:t>
             </a:r>
             <a:br>
               <a:rPr lang="en-US" sz="2800" dirty="0"/>
@@ -22684,19 +22721,27 @@
               <a:buChar char="§"/>
             </a:pPr>
             <a:r>
-              <a:rPr lang="en-US" sz="2800" b="1" dirty="0"/>
-              <a:t>More data type and model support:</a:t>
-            </a:r>
-            <a:r>
-              <a:rPr lang="en-US" sz="2800" dirty="0"/>
-              <a:t> image data, NLP support, support for model objects beyond </a:t>
-            </a:r>
-            <a:r>
-              <a:rPr lang="en-US" sz="2800" dirty="0" err="1"/>
+              <a:rPr lang="en-US" sz="2800" b="1" dirty="0">
+                <a:solidFill>
+                  <a:schemeClr val="accent1"/>
+                </a:solidFill>
+              </a:rPr>
+              <a:t>More data type and model support: image data, NLP support, support for model objects beyond </a:t>
+            </a:r>
+            <a:r>
+              <a:rPr lang="en-US" sz="2800" b="1" dirty="0" err="1">
+                <a:solidFill>
+                  <a:schemeClr val="accent1"/>
+                </a:solidFill>
+              </a:rPr>
               <a:t>sklearn</a:t>
             </a:r>
             <a:r>
-              <a:rPr lang="en-US" sz="2800" dirty="0"/>
+              <a:rPr lang="en-US" sz="2800" b="1" dirty="0">
+                <a:solidFill>
+                  <a:schemeClr val="accent1"/>
+                </a:solidFill>
+              </a:rPr>
               <a:t> classifiers</a:t>
             </a:r>
           </a:p>
@@ -23951,8 +23996,8 @@
         </p:blipFill>
         <p:spPr>
           <a:xfrm>
-            <a:off x="5608637" y="1782474"/>
-            <a:ext cx="5842000" cy="4025900"/>
+            <a:off x="5075238" y="1795893"/>
+            <a:ext cx="7334126" cy="5054169"/>
           </a:xfrm>
           <a:prstGeom prst="rect">
             <a:avLst/>
@@ -24137,6 +24182,88 @@
               <a:rPr lang="en-US" sz="2000" dirty="0"/>
             </a:br>
             <a:endParaRPr lang="en-US" sz="2000" dirty="0"/>
+          </a:p>
+        </p:txBody>
+      </p:sp>
+      <p:sp>
+        <p:nvSpPr>
+          <p:cNvPr id="4" name="Rectangle 3">
+            <a:extLst>
+              <a:ext uri="{FF2B5EF4-FFF2-40B4-BE49-F238E27FC236}">
+                <a16:creationId xmlns:a16="http://schemas.microsoft.com/office/drawing/2014/main" id="{9C14717C-2528-489E-A496-4EBC7C07B077}"/>
+              </a:ext>
+            </a:extLst>
+          </p:cNvPr>
+          <p:cNvSpPr/>
+          <p:nvPr/>
+        </p:nvSpPr>
+        <p:spPr bwMode="auto">
+          <a:xfrm>
+            <a:off x="4999037" y="1744662"/>
+            <a:ext cx="685800" cy="304800"/>
+          </a:xfrm>
+          <a:prstGeom prst="rect">
+            <a:avLst/>
+          </a:prstGeom>
+          <a:solidFill>
+            <a:schemeClr val="bg1"/>
+          </a:solidFill>
+          <a:ln>
+            <a:noFill/>
+            <a:headEnd type="none" w="med" len="med"/>
+            <a:tailEnd type="none" w="med" len="med"/>
+          </a:ln>
+          <a:effectLst/>
+        </p:spPr>
+        <p:style>
+          <a:lnRef idx="1">
+            <a:schemeClr val="accent2"/>
+          </a:lnRef>
+          <a:fillRef idx="3">
+            <a:schemeClr val="accent2"/>
+          </a:fillRef>
+          <a:effectRef idx="2">
+            <a:schemeClr val="accent2"/>
+          </a:effectRef>
+          <a:fontRef idx="minor">
+            <a:schemeClr val="lt1"/>
+          </a:fontRef>
+        </p:style>
+        <p:txBody>
+          <a:bodyPr rot="0" spcFirstLastPara="0" vertOverflow="overflow" horzOverflow="overflow" vert="horz" wrap="square" lIns="182880" tIns="146304" rIns="182880" bIns="146304" numCol="1" spcCol="0" rtlCol="0" fromWordArt="0" anchor="t" anchorCtr="0" forceAA="0" compatLnSpc="1">
+            <a:prstTxWarp prst="textNoShape">
+              <a:avLst/>
+            </a:prstTxWarp>
+            <a:noAutofit/>
+          </a:bodyPr>
+          <a:lstStyle/>
+          <a:p>
+            <a:pPr algn="ctr" defTabSz="932472" fontAlgn="base">
+              <a:lnSpc>
+                <a:spcPct val="90000"/>
+              </a:lnSpc>
+              <a:spcBef>
+                <a:spcPct val="0"/>
+              </a:spcBef>
+              <a:spcAft>
+                <a:spcPct val="0"/>
+              </a:spcAft>
+            </a:pPr>
+            <a:endParaRPr lang="en-US" sz="2400" dirty="0" err="1">
+              <a:gradFill>
+                <a:gsLst>
+                  <a:gs pos="0">
+                    <a:srgbClr val="FFFFFF"/>
+                  </a:gs>
+                  <a:gs pos="100000">
+                    <a:srgbClr val="FFFFFF"/>
+                  </a:gs>
+                </a:gsLst>
+                <a:lin ang="5400000" scaled="0"/>
+              </a:gradFill>
+              <a:ea typeface="Segoe UI" pitchFamily="34" charset="0"/>
+              <a:cs typeface="Segoe UI" pitchFamily="34" charset="0"/>
+            </a:endParaRPr>
           </a:p>
         </p:txBody>
       </p:sp>

</xml_diff>

<commit_message>
Adjustmets 2 to prez before class.
</commit_message>
<xml_diff>
--- a/docs/LIMEaid_Final.pptx
+++ b/docs/LIMEaid_Final.pptx
@@ -24934,15 +24934,7 @@
             </a:r>
             <a:r>
               <a:rPr lang="en-US" sz="2800" dirty="0"/>
-              <a:t>-learn classifiers that predict probabilities (</a:t>
-            </a:r>
-            <a:r>
-              <a:rPr lang="en-US" sz="2800" dirty="0" err="1"/>
-              <a:t>predict_proba</a:t>
-            </a:r>
-            <a:r>
-              <a:rPr lang="en-US" sz="2800" dirty="0"/>
-              <a:t> implemented)</a:t>
+              <a:t>-learn classifiers used to predict probabilities of median mid-career salary</a:t>
             </a:r>
           </a:p>
           <a:p>

</xml_diff>

<commit_message>
Added missing bullet point in Future Work slide.
</commit_message>
<xml_diff>
--- a/docs/LIMEaid_Final.pptx
+++ b/docs/LIMEaid_Final.pptx
@@ -29,7 +29,7 @@
     <p:sldId id="1513" r:id="rId17"/>
   </p:sldIdLst>
   <p:sldSz cx="12436475" cy="6994525"/>
-  <p:notesSz cx="6858000" cy="9144000"/>
+  <p:notesSz cx="7315200" cy="9601200"/>
   <p:defaultTextStyle>
     <a:defPPr>
       <a:defRPr lang="en-US"/>
@@ -242,12 +242,12 @@
     </p:ext>
     <p:ext uri="{2D200454-40CA-4A62-9FC3-DE9A4176ACB9}">
       <p15:notesGuideLst xmlns:p15="http://schemas.microsoft.com/office/powerpoint/2012/main">
-        <p15:guide id="1" orient="horz" pos="2880">
+        <p15:guide id="1" orient="horz" pos="3024" userDrawn="1">
           <p15:clr>
             <a:srgbClr val="A4A3A4"/>
           </p15:clr>
         </p15:guide>
-        <p15:guide id="2" pos="2160">
+        <p15:guide id="2" pos="2304" userDrawn="1">
           <p15:clr>
             <a:srgbClr val="A4A3A4"/>
           </p15:clr>
@@ -299,17 +299,17 @@
         <p:spPr>
           <a:xfrm>
             <a:off x="0" y="0"/>
-            <a:ext cx="2971800" cy="457200"/>
+            <a:ext cx="3169920" cy="480060"/>
           </a:xfrm>
           <a:prstGeom prst="rect">
             <a:avLst/>
           </a:prstGeom>
         </p:spPr>
         <p:txBody>
-          <a:bodyPr vert="horz" lIns="91440" tIns="45720" rIns="91440" bIns="45720" rtlCol="0"/>
+          <a:bodyPr vert="horz" lIns="96661" tIns="48331" rIns="96661" bIns="48331" rtlCol="0"/>
           <a:lstStyle>
             <a:lvl1pPr algn="l">
-              <a:defRPr sz="1200"/>
+              <a:defRPr sz="1300"/>
             </a:lvl1pPr>
           </a:lstStyle>
           <a:p>
@@ -331,18 +331,18 @@
         </p:nvSpPr>
         <p:spPr>
           <a:xfrm>
-            <a:off x="3884613" y="0"/>
-            <a:ext cx="2971800" cy="457200"/>
+            <a:off x="4143587" y="0"/>
+            <a:ext cx="3169920" cy="480060"/>
           </a:xfrm>
           <a:prstGeom prst="rect">
             <a:avLst/>
           </a:prstGeom>
         </p:spPr>
         <p:txBody>
-          <a:bodyPr vert="horz" lIns="91440" tIns="45720" rIns="91440" bIns="45720" rtlCol="0"/>
+          <a:bodyPr vert="horz" lIns="96661" tIns="48331" rIns="96661" bIns="48331" rtlCol="0"/>
           <a:lstStyle>
             <a:lvl1pPr algn="r">
-              <a:defRPr sz="1200"/>
+              <a:defRPr sz="1300"/>
             </a:lvl1pPr>
           </a:lstStyle>
           <a:p>
@@ -350,7 +350,7 @@
               <a:rPr lang="en-US" smtClean="0">
                 <a:latin typeface="Segoe UI" pitchFamily="34" charset="0"/>
               </a:rPr>
-              <a:t>6/9/19</a:t>
+              <a:t>6/10/2019</a:t>
             </a:fld>
             <a:endParaRPr lang="en-US" dirty="0">
               <a:latin typeface="Segoe UI" pitchFamily="34" charset="0"/>
@@ -370,22 +370,22 @@
         </p:nvSpPr>
         <p:spPr>
           <a:xfrm>
-            <a:off x="0" y="8685213"/>
-            <a:ext cx="5795010" cy="332434"/>
+            <a:off x="0" y="9119474"/>
+            <a:ext cx="6181344" cy="349056"/>
           </a:xfrm>
           <a:prstGeom prst="rect">
             <a:avLst/>
           </a:prstGeom>
         </p:spPr>
         <p:txBody>
-          <a:bodyPr vert="horz" lIns="91440" tIns="45720" rIns="91440" bIns="45720" rtlCol="0" anchor="b"/>
+          <a:bodyPr vert="horz" lIns="96661" tIns="48331" rIns="96661" bIns="48331" rtlCol="0" anchor="b"/>
           <a:lstStyle>
             <a:lvl1pPr algn="l">
-              <a:defRPr sz="1200"/>
+              <a:defRPr sz="1300"/>
             </a:lvl1pPr>
           </a:lstStyle>
           <a:p>
-            <a:pPr marL="398463" defTabSz="914099" eaLnBrk="0" hangingPunct="0"/>
+            <a:pPr marL="421215" defTabSz="966294" eaLnBrk="0" hangingPunct="0"/>
             <a:r>
               <a:rPr lang="en-US" sz="400" dirty="0">
                 <a:gradFill>
@@ -407,7 +407,7 @@
             </a:r>
           </a:p>
           <a:p>
-            <a:pPr marL="398463" defTabSz="914099" eaLnBrk="0" hangingPunct="0"/>
+            <a:pPr marL="421215" defTabSz="966294" eaLnBrk="0" hangingPunct="0"/>
             <a:r>
               <a:rPr lang="en-US" sz="400" dirty="0">
                 <a:gradFill>
@@ -442,18 +442,18 @@
         </p:nvSpPr>
         <p:spPr>
           <a:xfrm>
-            <a:off x="5783579" y="8685213"/>
-            <a:ext cx="1072833" cy="457200"/>
+            <a:off x="6169152" y="9119474"/>
+            <a:ext cx="1144355" cy="480060"/>
           </a:xfrm>
           <a:prstGeom prst="rect">
             <a:avLst/>
           </a:prstGeom>
         </p:spPr>
         <p:txBody>
-          <a:bodyPr vert="horz" lIns="91440" tIns="45720" rIns="91440" bIns="45720" rtlCol="0" anchor="b"/>
+          <a:bodyPr vert="horz" lIns="96661" tIns="48331" rIns="96661" bIns="48331" rtlCol="0" anchor="b"/>
           <a:lstStyle>
             <a:lvl1pPr algn="r">
-              <a:defRPr sz="1200"/>
+              <a:defRPr sz="1300"/>
             </a:lvl1pPr>
           </a:lstStyle>
           <a:p>
@@ -516,17 +516,17 @@
         <p:spPr>
           <a:xfrm>
             <a:off x="0" y="0"/>
-            <a:ext cx="2971800" cy="457200"/>
+            <a:ext cx="3169920" cy="480060"/>
           </a:xfrm>
           <a:prstGeom prst="rect">
             <a:avLst/>
           </a:prstGeom>
         </p:spPr>
         <p:txBody>
-          <a:bodyPr vert="horz" lIns="91440" tIns="45720" rIns="91440" bIns="45720" rtlCol="0"/>
+          <a:bodyPr vert="horz" lIns="96661" tIns="48331" rIns="96661" bIns="48331" rtlCol="0"/>
           <a:lstStyle>
             <a:lvl1pPr algn="l">
-              <a:defRPr sz="1200">
+              <a:defRPr sz="1300">
                 <a:latin typeface="Segoe UI" pitchFamily="34" charset="0"/>
               </a:defRPr>
             </a:lvl1pPr>
@@ -548,8 +548,8 @@
         </p:nvSpPr>
         <p:spPr>
           <a:xfrm>
-            <a:off x="381000" y="685800"/>
-            <a:ext cx="6096000" cy="3429000"/>
+            <a:off x="457200" y="720725"/>
+            <a:ext cx="6400800" cy="3600450"/>
           </a:xfrm>
           <a:prstGeom prst="rect">
             <a:avLst/>
@@ -562,7 +562,7 @@
           </a:ln>
         </p:spPr>
         <p:txBody>
-          <a:bodyPr vert="horz" lIns="91440" tIns="45720" rIns="91440" bIns="45720" rtlCol="0" anchor="ctr"/>
+          <a:bodyPr vert="horz" lIns="96661" tIns="48331" rIns="96661" bIns="48331" rtlCol="0" anchor="ctr"/>
           <a:lstStyle/>
           <a:p>
             <a:endParaRPr lang="en-US" dirty="0"/>
@@ -581,24 +581,24 @@
         </p:nvSpPr>
         <p:spPr>
           <a:xfrm>
-            <a:off x="0" y="8686800"/>
-            <a:ext cx="5920740" cy="355964"/>
+            <a:off x="0" y="9121140"/>
+            <a:ext cx="6315456" cy="373762"/>
           </a:xfrm>
           <a:prstGeom prst="rect">
             <a:avLst/>
           </a:prstGeom>
         </p:spPr>
         <p:txBody>
-          <a:bodyPr vert="horz" lIns="91440" tIns="45720" rIns="91440" bIns="45720" rtlCol="0" anchor="b"/>
+          <a:bodyPr vert="horz" lIns="96661" tIns="48331" rIns="96661" bIns="48331" rtlCol="0" anchor="b"/>
           <a:lstStyle>
-            <a:lvl1pPr marL="571500" indent="0" algn="l">
-              <a:defRPr sz="1200"/>
+            <a:lvl1pPr marL="604133" indent="0" algn="l">
+              <a:defRPr sz="1300"/>
             </a:lvl1pPr>
           </a:lstStyle>
           <a:p>
-            <a:pPr defTabSz="914099" eaLnBrk="0" hangingPunct="0"/>
-            <a:r>
-              <a:rPr lang="en-US" sz="400" dirty="0">
+            <a:pPr defTabSz="966294" eaLnBrk="0" hangingPunct="0"/>
+            <a:r>
+              <a:rPr lang="en-US" sz="400">
                 <a:gradFill>
                   <a:gsLst>
                     <a:gs pos="0">
@@ -618,9 +618,9 @@
             </a:r>
           </a:p>
           <a:p>
-            <a:pPr defTabSz="914099" eaLnBrk="0" hangingPunct="0"/>
-            <a:r>
-              <a:rPr lang="en-US" sz="400" dirty="0">
+            <a:pPr defTabSz="966294" eaLnBrk="0" hangingPunct="0"/>
+            <a:r>
+              <a:rPr lang="en-US" sz="400">
                 <a:gradFill>
                   <a:gsLst>
                     <a:gs pos="0">
@@ -638,6 +638,22 @@
               </a:rPr>
               <a:t>The information herein is for informational purposes only and represents the current view of Microsoft Corporation as of the date of this presentation.  Because Microsoft must respond to changing market conditions, it should not be interpreted to be a commitment on the part of Microsoft, and Microsoft cannot guarantee the accuracy of any information provided after the date of this presentation.  MICROSOFT MAKES NO WARRANTIES, EXPRESS, IMPLIED OR STATUTORY, AS TO THE INFORMATION IN THIS PRESENTATION.</a:t>
             </a:r>
+            <a:endParaRPr lang="en-US" sz="400" dirty="0">
+              <a:gradFill>
+                <a:gsLst>
+                  <a:gs pos="0">
+                    <a:prstClr val="black"/>
+                  </a:gs>
+                  <a:gs pos="100000">
+                    <a:prstClr val="black"/>
+                  </a:gs>
+                </a:gsLst>
+                <a:lin ang="5400000" scaled="0"/>
+              </a:gradFill>
+              <a:latin typeface="Segoe UI" pitchFamily="34" charset="0"/>
+              <a:ea typeface="Segoe UI" pitchFamily="34" charset="0"/>
+              <a:cs typeface="Segoe UI" pitchFamily="34" charset="0"/>
+            </a:endParaRPr>
           </a:p>
         </p:txBody>
       </p:sp>
@@ -653,18 +669,18 @@
         </p:nvSpPr>
         <p:spPr>
           <a:xfrm>
-            <a:off x="3884613" y="0"/>
-            <a:ext cx="2971800" cy="457200"/>
+            <a:off x="4143587" y="0"/>
+            <a:ext cx="3169920" cy="480060"/>
           </a:xfrm>
           <a:prstGeom prst="rect">
             <a:avLst/>
           </a:prstGeom>
         </p:spPr>
         <p:txBody>
-          <a:bodyPr vert="horz" lIns="91440" tIns="45720" rIns="91440" bIns="45720" rtlCol="0"/>
+          <a:bodyPr vert="horz" lIns="96661" tIns="48331" rIns="96661" bIns="48331" rtlCol="0"/>
           <a:lstStyle>
             <a:lvl1pPr algn="r">
-              <a:defRPr sz="1200">
+              <a:defRPr sz="1300">
                 <a:latin typeface="Segoe UI" pitchFamily="34" charset="0"/>
               </a:defRPr>
             </a:lvl1pPr>
@@ -673,7 +689,7 @@
             <a:fld id="{D51B1278-D92B-4AF3-A9C1-71DD298190CE}" type="datetimeFigureOut">
               <a:rPr lang="en-US" smtClean="0"/>
               <a:pPr/>
-              <a:t>6/9/19</a:t>
+              <a:t>6/10/2019</a:t>
             </a:fld>
             <a:endParaRPr lang="en-US" dirty="0"/>
           </a:p>
@@ -691,15 +707,15 @@
         </p:nvSpPr>
         <p:spPr>
           <a:xfrm>
-            <a:off x="685800" y="4343400"/>
-            <a:ext cx="5486400" cy="4114800"/>
+            <a:off x="731520" y="4560570"/>
+            <a:ext cx="5852160" cy="4320540"/>
           </a:xfrm>
           <a:prstGeom prst="rect">
             <a:avLst/>
           </a:prstGeom>
         </p:spPr>
         <p:txBody>
-          <a:bodyPr vert="horz" lIns="91440" tIns="45720" rIns="91440" bIns="45720" rtlCol="0"/>
+          <a:bodyPr vert="horz" lIns="96661" tIns="48331" rIns="96661" bIns="48331" rtlCol="0"/>
           <a:lstStyle/>
           <a:p>
             <a:pPr lvl="0"/>
@@ -750,18 +766,18 @@
         </p:nvSpPr>
         <p:spPr>
           <a:xfrm>
-            <a:off x="5909309" y="8685213"/>
-            <a:ext cx="947103" cy="457200"/>
+            <a:off x="6303264" y="9119474"/>
+            <a:ext cx="1010243" cy="480060"/>
           </a:xfrm>
           <a:prstGeom prst="rect">
             <a:avLst/>
           </a:prstGeom>
         </p:spPr>
         <p:txBody>
-          <a:bodyPr vert="horz" lIns="91440" tIns="45720" rIns="91440" bIns="45720" rtlCol="0" anchor="b"/>
+          <a:bodyPr vert="horz" lIns="96661" tIns="48331" rIns="96661" bIns="48331" rtlCol="0" anchor="b"/>
           <a:lstStyle>
             <a:lvl1pPr algn="r">
-              <a:defRPr sz="1200">
+              <a:defRPr sz="1300">
                 <a:latin typeface="Segoe UI" pitchFamily="34" charset="0"/>
               </a:defRPr>
             </a:lvl1pPr>
@@ -988,7 +1004,7 @@
                 </a:solidFill>
               </a:rPr>
               <a:pPr/>
-              <a:t>6/9/19</a:t>
+              <a:t>6/10/2019</a:t>
             </a:fld>
             <a:endParaRPr lang="en-US" dirty="0">
               <a:solidFill>
@@ -1045,7 +1061,7 @@
           <a:bodyPr/>
           <a:lstStyle/>
           <a:p>
-            <a:pPr defTabSz="914099" eaLnBrk="0" hangingPunct="0"/>
+            <a:pPr defTabSz="966294" eaLnBrk="0" hangingPunct="0"/>
             <a:r>
               <a:rPr lang="en-US" sz="400">
                 <a:gradFill>
@@ -1179,7 +1195,7 @@
           <a:bodyPr/>
           <a:lstStyle/>
           <a:p>
-            <a:pPr defTabSz="914099" eaLnBrk="0" hangingPunct="0"/>
+            <a:pPr defTabSz="966294" eaLnBrk="0" hangingPunct="0"/>
             <a:r>
               <a:rPr lang="en-US" sz="400">
                 <a:gradFill>
@@ -1201,7 +1217,7 @@
             </a:r>
           </a:p>
           <a:p>
-            <a:pPr defTabSz="914099" eaLnBrk="0" hangingPunct="0"/>
+            <a:pPr defTabSz="966294" eaLnBrk="0" hangingPunct="0"/>
             <a:r>
               <a:rPr lang="en-US" sz="400">
                 <a:gradFill>
@@ -1257,7 +1273,7 @@
           <a:p>
             <a:fld id="{A2F80D1E-9BB7-3E4A-A07B-506B5A450EB9}" type="datetime1">
               <a:rPr lang="en-US" smtClean="0"/>
-              <a:t>6/9/19</a:t>
+              <a:t>6/10/2019</a:t>
             </a:fld>
             <a:endParaRPr lang="en-US" dirty="0"/>
           </a:p>
@@ -1382,7 +1398,7 @@
           <a:bodyPr/>
           <a:lstStyle/>
           <a:p>
-            <a:pPr defTabSz="914099" eaLnBrk="0" hangingPunct="0"/>
+            <a:pPr defTabSz="966294" eaLnBrk="0" hangingPunct="0"/>
             <a:r>
               <a:rPr lang="en-US" sz="400">
                 <a:gradFill>
@@ -1404,7 +1420,7 @@
             </a:r>
           </a:p>
           <a:p>
-            <a:pPr defTabSz="914099" eaLnBrk="0" hangingPunct="0"/>
+            <a:pPr defTabSz="966294" eaLnBrk="0" hangingPunct="0"/>
             <a:r>
               <a:rPr lang="en-US" sz="400">
                 <a:gradFill>
@@ -1460,7 +1476,7 @@
           <a:p>
             <a:fld id="{2CC38E55-4D15-FF41-95D7-947B6B24F6A2}" type="datetime1">
               <a:rPr lang="en-US" smtClean="0"/>
-              <a:t>6/9/19</a:t>
+              <a:t>6/10/2019</a:t>
             </a:fld>
             <a:endParaRPr lang="en-US" dirty="0"/>
           </a:p>
@@ -1585,7 +1601,7 @@
           <a:bodyPr/>
           <a:lstStyle/>
           <a:p>
-            <a:pPr defTabSz="914099" eaLnBrk="0" hangingPunct="0"/>
+            <a:pPr defTabSz="966294" eaLnBrk="0" hangingPunct="0"/>
             <a:r>
               <a:rPr lang="en-US" sz="400">
                 <a:gradFill>
@@ -1607,7 +1623,7 @@
             </a:r>
           </a:p>
           <a:p>
-            <a:pPr defTabSz="914099" eaLnBrk="0" hangingPunct="0"/>
+            <a:pPr defTabSz="966294" eaLnBrk="0" hangingPunct="0"/>
             <a:r>
               <a:rPr lang="en-US" sz="400">
                 <a:gradFill>
@@ -1663,7 +1679,7 @@
           <a:p>
             <a:fld id="{88CF5C58-8920-5340-87E4-AA96765D5BFA}" type="datetime1">
               <a:rPr lang="en-US" smtClean="0"/>
-              <a:t>6/9/19</a:t>
+              <a:t>6/10/2019</a:t>
             </a:fld>
             <a:endParaRPr lang="en-US" dirty="0"/>
           </a:p>
@@ -1788,7 +1804,7 @@
           <a:bodyPr/>
           <a:lstStyle/>
           <a:p>
-            <a:pPr defTabSz="914099" eaLnBrk="0" hangingPunct="0"/>
+            <a:pPr defTabSz="966294" eaLnBrk="0" hangingPunct="0"/>
             <a:r>
               <a:rPr lang="en-US" sz="400">
                 <a:gradFill>
@@ -1810,7 +1826,7 @@
             </a:r>
           </a:p>
           <a:p>
-            <a:pPr defTabSz="914099" eaLnBrk="0" hangingPunct="0"/>
+            <a:pPr defTabSz="966294" eaLnBrk="0" hangingPunct="0"/>
             <a:r>
               <a:rPr lang="en-US" sz="400">
                 <a:gradFill>
@@ -1866,7 +1882,7 @@
           <a:p>
             <a:fld id="{2E78417D-D831-3149-81FB-4412A9D9D9EA}" type="datetime1">
               <a:rPr lang="en-US" smtClean="0"/>
-              <a:t>6/9/19</a:t>
+              <a:t>6/10/2019</a:t>
             </a:fld>
             <a:endParaRPr lang="en-US" dirty="0"/>
           </a:p>
@@ -1991,7 +2007,7 @@
           <a:bodyPr/>
           <a:lstStyle/>
           <a:p>
-            <a:pPr defTabSz="914099" eaLnBrk="0" hangingPunct="0"/>
+            <a:pPr defTabSz="966294" eaLnBrk="0" hangingPunct="0"/>
             <a:r>
               <a:rPr lang="en-US" sz="400">
                 <a:gradFill>
@@ -2013,7 +2029,7 @@
             </a:r>
           </a:p>
           <a:p>
-            <a:pPr defTabSz="914099" eaLnBrk="0" hangingPunct="0"/>
+            <a:pPr defTabSz="966294" eaLnBrk="0" hangingPunct="0"/>
             <a:r>
               <a:rPr lang="en-US" sz="400">
                 <a:gradFill>
@@ -2069,7 +2085,7 @@
           <a:p>
             <a:fld id="{A40AB584-262F-C941-90EB-DE58EC429993}" type="datetime1">
               <a:rPr lang="en-US" smtClean="0"/>
-              <a:t>6/9/19</a:t>
+              <a:t>6/10/2019</a:t>
             </a:fld>
             <a:endParaRPr lang="en-US" dirty="0"/>
           </a:p>
@@ -2194,7 +2210,7 @@
           <a:bodyPr/>
           <a:lstStyle/>
           <a:p>
-            <a:pPr defTabSz="914099" eaLnBrk="0" hangingPunct="0"/>
+            <a:pPr defTabSz="966294" eaLnBrk="0" hangingPunct="0"/>
             <a:r>
               <a:rPr lang="en-US" sz="400">
                 <a:gradFill>
@@ -2216,7 +2232,7 @@
             </a:r>
           </a:p>
           <a:p>
-            <a:pPr defTabSz="914099" eaLnBrk="0" hangingPunct="0"/>
+            <a:pPr defTabSz="966294" eaLnBrk="0" hangingPunct="0"/>
             <a:r>
               <a:rPr lang="en-US" sz="400">
                 <a:gradFill>
@@ -2272,7 +2288,7 @@
           <a:p>
             <a:fld id="{3431E417-7B3F-7140-A6E3-2413BC0EF3AE}" type="datetime1">
               <a:rPr lang="en-US" smtClean="0"/>
-              <a:t>6/9/19</a:t>
+              <a:t>6/10/2019</a:t>
             </a:fld>
             <a:endParaRPr lang="en-US" dirty="0"/>
           </a:p>
@@ -2397,7 +2413,7 @@
           <a:bodyPr/>
           <a:lstStyle/>
           <a:p>
-            <a:pPr defTabSz="914099" eaLnBrk="0" hangingPunct="0"/>
+            <a:pPr defTabSz="966294" eaLnBrk="0" hangingPunct="0"/>
             <a:r>
               <a:rPr lang="en-US" sz="400">
                 <a:gradFill>
@@ -2419,7 +2435,7 @@
             </a:r>
           </a:p>
           <a:p>
-            <a:pPr defTabSz="914099" eaLnBrk="0" hangingPunct="0"/>
+            <a:pPr defTabSz="966294" eaLnBrk="0" hangingPunct="0"/>
             <a:r>
               <a:rPr lang="en-US" sz="400">
                 <a:gradFill>
@@ -2475,7 +2491,7 @@
           <a:p>
             <a:fld id="{C5F982DC-979A-754C-8344-48D9C9F14C14}" type="datetime1">
               <a:rPr lang="en-US" smtClean="0"/>
-              <a:t>6/9/19</a:t>
+              <a:t>6/10/2019</a:t>
             </a:fld>
             <a:endParaRPr lang="en-US" dirty="0"/>
           </a:p>
@@ -23970,8 +23986,8 @@
         </p:nvSpPr>
         <p:spPr>
           <a:xfrm>
-            <a:off x="274639" y="1212849"/>
-            <a:ext cx="11889564" cy="6235553"/>
+            <a:off x="273455" y="1135062"/>
+            <a:ext cx="11889564" cy="7183505"/>
           </a:xfrm>
         </p:spPr>
         <p:txBody>
@@ -24102,6 +24118,29 @@
             <a:r>
               <a:rPr lang="en-US" sz="2800" dirty="0"/>
               <a:t> for number of coefficients</a:t>
+            </a:r>
+          </a:p>
+          <a:p>
+            <a:pPr>
+              <a:buClr>
+                <a:schemeClr val="tx2"/>
+              </a:buClr>
+            </a:pPr>
+            <a:endParaRPr lang="en-US" sz="2800" dirty="0"/>
+          </a:p>
+          <a:p>
+            <a:pPr>
+              <a:buClr>
+                <a:schemeClr val="tx2"/>
+              </a:buClr>
+            </a:pPr>
+            <a:r>
+              <a:rPr lang="en-US" sz="2800" b="1" dirty="0"/>
+              <a:t>Improve method</a:t>
+            </a:r>
+            <a:r>
+              <a:rPr lang="en-US" sz="2800" dirty="0"/>
+              <a:t> to generate random samples</a:t>
             </a:r>
             <a:br>
               <a:rPr lang="en-US" sz="2800" dirty="0"/>

</xml_diff>